<commit_message>
bolded new slide title
</commit_message>
<xml_diff>
--- a/Assignment 7/AS7.pptx
+++ b/Assignment 7/AS7.pptx
@@ -113,6 +113,11 @@
       </a:defRPr>
     </a:lvl9pPr>
   </p:defaultTextStyle>
+  <p:extLst>
+    <p:ext uri="{EFAFB233-063F-42B5-8137-9DF3F51BA10A}">
+      <p15:sldGuideLst xmlns:p15="http://schemas.microsoft.com/office/powerpoint/2012/main"/>
+    </p:ext>
+  </p:extLst>
 </p:presentation>
 </file>
 
@@ -6586,7 +6591,7 @@
           <a:lstStyle/>
           <a:p>
             <a:r>
-              <a:rPr lang="en-CA" sz="2800" dirty="0" err="1">
+              <a:rPr lang="en-CA" sz="2800" b="1" dirty="0" err="1">
                 <a:solidFill>
                   <a:schemeClr val="bg1"/>
                 </a:solidFill>
@@ -6594,7 +6599,7 @@
               <a:t>BankAccount</a:t>
             </a:r>
             <a:r>
-              <a:rPr lang="en-CA" sz="2800" dirty="0">
+              <a:rPr lang="en-CA" sz="2800" b="1" dirty="0">
                 <a:solidFill>
                   <a:schemeClr val="bg1"/>
                 </a:solidFill>
@@ -6602,7 +6607,7 @@
               <a:t> b2 = new </a:t>
             </a:r>
             <a:r>
-              <a:rPr lang="en-CA" sz="2800" dirty="0" err="1">
+              <a:rPr lang="en-CA" sz="2800" b="1" dirty="0" err="1">
                 <a:solidFill>
                   <a:schemeClr val="bg1"/>
                 </a:solidFill>
@@ -6610,14 +6615,14 @@
               <a:t>SavingsAccount</a:t>
             </a:r>
             <a:r>
-              <a:rPr lang="en-CA" sz="2800" dirty="0">
+              <a:rPr lang="en-CA" sz="2800" b="1" dirty="0">
                 <a:solidFill>
                   <a:schemeClr val="bg1"/>
                 </a:solidFill>
               </a:rPr>
               <a:t>(new Customer("Jane Doe", 2002), 500.0, 5.0);</a:t>
             </a:r>
-            <a:endParaRPr lang="en-US" sz="2800" dirty="0">
+            <a:endParaRPr lang="en-US" sz="2800" b="1" dirty="0">
               <a:solidFill>
                 <a:schemeClr val="bg1"/>
               </a:solidFill>

</xml_diff>